<commit_message>
SB & SHC models complete
- MSA being tested
</commit_message>
<xml_diff>
--- a/Progress Checks/ProjChk1.pptx
+++ b/Progress Checks/ProjChk1.pptx
@@ -143,10 +143,33 @@
   <pc:docChgLst>
     <pc:chgData name="Boyang ( Bryan ) Zhao" userId="da72a6ca-e04c-4f93-b079-3b91c46c24f0" providerId="ADAL" clId="{A07A38EE-4DE1-497A-91F8-3090DA753EA1}"/>
     <pc:docChg chg="undo custSel modSld">
-      <pc:chgData name="Boyang ( Bryan ) Zhao" userId="da72a6ca-e04c-4f93-b079-3b91c46c24f0" providerId="ADAL" clId="{A07A38EE-4DE1-497A-91F8-3090DA753EA1}" dt="2023-04-20T15:38:48.323" v="17" actId="9405"/>
+      <pc:chgData name="Boyang ( Bryan ) Zhao" userId="da72a6ca-e04c-4f93-b079-3b91c46c24f0" providerId="ADAL" clId="{A07A38EE-4DE1-497A-91F8-3090DA753EA1}" dt="2023-04-20T19:02:49.915" v="55" actId="20577"/>
       <pc:docMkLst>
         <pc:docMk/>
       </pc:docMkLst>
+      <pc:sldChg chg="modSp mod">
+        <pc:chgData name="Boyang ( Bryan ) Zhao" userId="da72a6ca-e04c-4f93-b079-3b91c46c24f0" providerId="ADAL" clId="{A07A38EE-4DE1-497A-91F8-3090DA753EA1}" dt="2023-04-20T19:02:49.915" v="55" actId="20577"/>
+        <pc:sldMkLst>
+          <pc:docMk/>
+          <pc:sldMk cId="3111549375" sldId="256"/>
+        </pc:sldMkLst>
+        <pc:spChg chg="mod">
+          <ac:chgData name="Boyang ( Bryan ) Zhao" userId="da72a6ca-e04c-4f93-b079-3b91c46c24f0" providerId="ADAL" clId="{A07A38EE-4DE1-497A-91F8-3090DA753EA1}" dt="2023-04-20T19:02:49.915" v="55" actId="20577"/>
+          <ac:spMkLst>
+            <pc:docMk/>
+            <pc:sldMk cId="3111549375" sldId="256"/>
+            <ac:spMk id="7" creationId="{0814B6A3-5F3E-4909-8ED5-87FE82492264}"/>
+          </ac:spMkLst>
+        </pc:spChg>
+        <pc:spChg chg="mod">
+          <ac:chgData name="Boyang ( Bryan ) Zhao" userId="da72a6ca-e04c-4f93-b079-3b91c46c24f0" providerId="ADAL" clId="{A07A38EE-4DE1-497A-91F8-3090DA753EA1}" dt="2023-04-20T18:48:39.521" v="39" actId="20577"/>
+          <ac:spMkLst>
+            <pc:docMk/>
+            <pc:sldMk cId="3111549375" sldId="256"/>
+            <ac:spMk id="8" creationId="{4B0552E2-3F84-4A73-A16B-C54043C663D5}"/>
+          </ac:spMkLst>
+        </pc:spChg>
+      </pc:sldChg>
       <pc:sldChg chg="addSp modSp mod">
         <pc:chgData name="Boyang ( Bryan ) Zhao" userId="da72a6ca-e04c-4f93-b079-3b91c46c24f0" providerId="ADAL" clId="{A07A38EE-4DE1-497A-91F8-3090DA753EA1}" dt="2023-04-20T15:29:55.303" v="6" actId="1076"/>
         <pc:sldMkLst>
@@ -10048,7 +10071,7 @@
               </a:lnSpc>
             </a:pPr>
             <a:r>
-              <a:rPr lang="en-US" sz="2800">
+              <a:rPr lang="en-US" sz="2800" dirty="0">
                 <a:solidFill>
                   <a:schemeClr val="tx1">
                     <a:lumMod val="75000"/>
@@ -10056,7 +10079,29 @@
                   </a:schemeClr>
                 </a:solidFill>
               </a:rPr>
-              <a:t>Project Boyang’s Fish</a:t>
+              <a:t>Project </a:t>
+            </a:r>
+            <a:r>
+              <a:rPr lang="en-US" sz="2800" dirty="0" err="1">
+                <a:solidFill>
+                  <a:schemeClr val="tx1">
+                    <a:lumMod val="75000"/>
+                    <a:lumOff val="25000"/>
+                  </a:schemeClr>
+                </a:solidFill>
+              </a:rPr>
+              <a:t>Boyang’s</a:t>
+            </a:r>
+            <a:r>
+              <a:rPr lang="en-US" sz="2800" dirty="0">
+                <a:solidFill>
+                  <a:schemeClr val="tx1">
+                    <a:lumMod val="75000"/>
+                    <a:lumOff val="25000"/>
+                  </a:schemeClr>
+                </a:solidFill>
+              </a:rPr>
+              <a:t> Fish</a:t>
             </a:r>
           </a:p>
         </p:txBody>
@@ -10198,7 +10243,7 @@
             </a:pPr>
             <a:r>
               <a:rPr lang="en-US" sz="1300" dirty="0"/>
-              <a:t>Andy Meng – Graphic Designer</a:t>
+              <a:t>Andy Meng – Graphic Designer &amp; Financial Manager</a:t>
             </a:r>
           </a:p>
           <a:p>
@@ -15078,8 +15123,8 @@
           </a:p>
         </p:txBody>
       </p:sp>
-      <mc:AlternateContent xmlns:mc="http://schemas.openxmlformats.org/markup-compatibility/2006">
-        <mc:Choice xmlns:p14="http://schemas.microsoft.com/office/powerpoint/2010/main" xmlns:aink="http://schemas.microsoft.com/office/drawing/2016/ink" Requires="p14 aink">
+      <mc:AlternateContent xmlns:mc="http://schemas.openxmlformats.org/markup-compatibility/2006" xmlns:p14="http://schemas.microsoft.com/office/powerpoint/2010/main" xmlns:aink="http://schemas.microsoft.com/office/drawing/2016/ink">
+        <mc:Choice Requires="p14 aink">
           <p:contentPart p14:bwMode="auto" r:id="rId3">
             <p14:nvContentPartPr>
               <p14:cNvPr id="3" name="Ink 2">
@@ -15098,7 +15143,7 @@
             </p14:xfrm>
           </p:contentPart>
         </mc:Choice>
-        <mc:Fallback>
+        <mc:Fallback xmlns="">
           <p:pic>
             <p:nvPicPr>
               <p:cNvPr id="3" name="Ink 2">
@@ -15129,8 +15174,8 @@
           </p:pic>
         </mc:Fallback>
       </mc:AlternateContent>
-      <mc:AlternateContent xmlns:mc="http://schemas.openxmlformats.org/markup-compatibility/2006">
-        <mc:Choice xmlns:p14="http://schemas.microsoft.com/office/powerpoint/2010/main" xmlns:aink="http://schemas.microsoft.com/office/drawing/2016/ink" Requires="p14 aink">
+      <mc:AlternateContent xmlns:mc="http://schemas.openxmlformats.org/markup-compatibility/2006" xmlns:p14="http://schemas.microsoft.com/office/powerpoint/2010/main" xmlns:aink="http://schemas.microsoft.com/office/drawing/2016/ink">
+        <mc:Choice Requires="p14 aink">
           <p:contentPart p14:bwMode="auto" r:id="rId5">
             <p14:nvContentPartPr>
               <p14:cNvPr id="4" name="Ink 3">
@@ -15149,7 +15194,7 @@
             </p14:xfrm>
           </p:contentPart>
         </mc:Choice>
-        <mc:Fallback>
+        <mc:Fallback xmlns="">
           <p:pic>
             <p:nvPicPr>
               <p:cNvPr id="4" name="Ink 3">
@@ -15180,8 +15225,8 @@
           </p:pic>
         </mc:Fallback>
       </mc:AlternateContent>
-      <mc:AlternateContent xmlns:mc="http://schemas.openxmlformats.org/markup-compatibility/2006">
-        <mc:Choice xmlns:p14="http://schemas.microsoft.com/office/powerpoint/2010/main" xmlns:aink="http://schemas.microsoft.com/office/drawing/2016/ink" Requires="p14 aink">
+      <mc:AlternateContent xmlns:mc="http://schemas.openxmlformats.org/markup-compatibility/2006" xmlns:p14="http://schemas.microsoft.com/office/powerpoint/2010/main" xmlns:aink="http://schemas.microsoft.com/office/drawing/2016/ink">
+        <mc:Choice Requires="p14 aink">
           <p:contentPart p14:bwMode="auto" r:id="rId7">
             <p14:nvContentPartPr>
               <p14:cNvPr id="6" name="Ink 5">
@@ -15200,7 +15245,7 @@
             </p14:xfrm>
           </p:contentPart>
         </mc:Choice>
-        <mc:Fallback>
+        <mc:Fallback xmlns="">
           <p:pic>
             <p:nvPicPr>
               <p:cNvPr id="6" name="Ink 5">
@@ -17123,12 +17168,22 @@
 </file>
 
 <file path=customXml/item1.xml><?xml version="1.0" encoding="utf-8"?>
-<?mso-contentType ?>
-<FormTemplates xmlns="http://schemas.microsoft.com/sharepoint/v3/contenttype/forms">
-  <Display>DocumentLibraryForm</Display>
-  <Edit>DocumentLibraryForm</Edit>
-  <New>DocumentLibraryForm</New>
-</FormTemplates>
+<p:properties xmlns:p="http://schemas.microsoft.com/office/2006/metadata/properties" xmlns:xsi="http://www.w3.org/2001/XMLSchema-instance" xmlns:pc="http://schemas.microsoft.com/office/infopath/2007/PartnerControls">
+  <documentManagement>
+    <_ip_UnifiedCompliancePolicyUIAction xmlns="http://schemas.microsoft.com/sharepoint/v3" xsi:nil="true"/>
+    <Image xmlns="71af3243-3dd4-4a8d-8c0d-dd76da1f02a5">
+      <Url xsi:nil="true"/>
+      <Description xsi:nil="true"/>
+    </Image>
+    <Status xmlns="71af3243-3dd4-4a8d-8c0d-dd76da1f02a5">Not started</Status>
+    <_ip_UnifiedCompliancePolicyProperties xmlns="http://schemas.microsoft.com/sharepoint/v3" xsi:nil="true"/>
+    <lcf76f155ced4ddcb4097134ff3c332f xmlns="71af3243-3dd4-4a8d-8c0d-dd76da1f02a5">
+      <Terms xmlns="http://schemas.microsoft.com/office/infopath/2007/PartnerControls"/>
+    </lcf76f155ced4ddcb4097134ff3c332f>
+    <TaxCatchAll xmlns="230e9df3-be65-4c73-a93b-d1236ebd677e"/>
+    <MediaServiceKeyPoints xmlns="71af3243-3dd4-4a8d-8c0d-dd76da1f02a5" xsi:nil="true"/>
+  </documentManagement>
+</p:properties>
 </file>
 
 <file path=customXml/item2.xml><?xml version="1.0" encoding="utf-8"?>
@@ -17408,28 +17463,22 @@
 </file>
 
 <file path=customXml/item3.xml><?xml version="1.0" encoding="utf-8"?>
-<p:properties xmlns:p="http://schemas.microsoft.com/office/2006/metadata/properties" xmlns:xsi="http://www.w3.org/2001/XMLSchema-instance" xmlns:pc="http://schemas.microsoft.com/office/infopath/2007/PartnerControls">
-  <documentManagement>
-    <_ip_UnifiedCompliancePolicyUIAction xmlns="http://schemas.microsoft.com/sharepoint/v3" xsi:nil="true"/>
-    <Image xmlns="71af3243-3dd4-4a8d-8c0d-dd76da1f02a5">
-      <Url xsi:nil="true"/>
-      <Description xsi:nil="true"/>
-    </Image>
-    <Status xmlns="71af3243-3dd4-4a8d-8c0d-dd76da1f02a5">Not started</Status>
-    <_ip_UnifiedCompliancePolicyProperties xmlns="http://schemas.microsoft.com/sharepoint/v3" xsi:nil="true"/>
-    <lcf76f155ced4ddcb4097134ff3c332f xmlns="71af3243-3dd4-4a8d-8c0d-dd76da1f02a5">
-      <Terms xmlns="http://schemas.microsoft.com/office/infopath/2007/PartnerControls"/>
-    </lcf76f155ced4ddcb4097134ff3c332f>
-    <TaxCatchAll xmlns="230e9df3-be65-4c73-a93b-d1236ebd677e"/>
-    <MediaServiceKeyPoints xmlns="71af3243-3dd4-4a8d-8c0d-dd76da1f02a5" xsi:nil="true"/>
-  </documentManagement>
-</p:properties>
+<?mso-contentType ?>
+<FormTemplates xmlns="http://schemas.microsoft.com/sharepoint/v3/contenttype/forms">
+  <Display>DocumentLibraryForm</Display>
+  <Edit>DocumentLibraryForm</Edit>
+  <New>DocumentLibraryForm</New>
+</FormTemplates>
 </file>
 
 <file path=customXml/itemProps1.xml><?xml version="1.0" encoding="utf-8"?>
-<ds:datastoreItem xmlns:ds="http://schemas.openxmlformats.org/officeDocument/2006/customXml" ds:itemID="{100F1594-3EA9-4B35-B72A-00D8B89F015B}">
+<ds:datastoreItem xmlns:ds="http://schemas.openxmlformats.org/officeDocument/2006/customXml" ds:itemID="{9BF9B764-6365-43A2-B92A-B9C4DD6E9B23}">
   <ds:schemaRefs>
-    <ds:schemaRef ds:uri="http://schemas.microsoft.com/sharepoint/v3/contenttype/forms"/>
+    <ds:schemaRef ds:uri="http://schemas.microsoft.com/office/2006/metadata/properties"/>
+    <ds:schemaRef ds:uri="http://schemas.microsoft.com/office/infopath/2007/PartnerControls"/>
+    <ds:schemaRef ds:uri="http://schemas.microsoft.com/sharepoint/v3"/>
+    <ds:schemaRef ds:uri="71af3243-3dd4-4a8d-8c0d-dd76da1f02a5"/>
+    <ds:schemaRef ds:uri="230e9df3-be65-4c73-a93b-d1236ebd677e"/>
   </ds:schemaRefs>
 </ds:datastoreItem>
 </file>
@@ -17456,13 +17505,9 @@
 </file>
 
 <file path=customXml/itemProps3.xml><?xml version="1.0" encoding="utf-8"?>
-<ds:datastoreItem xmlns:ds="http://schemas.openxmlformats.org/officeDocument/2006/customXml" ds:itemID="{9BF9B764-6365-43A2-B92A-B9C4DD6E9B23}">
+<ds:datastoreItem xmlns:ds="http://schemas.openxmlformats.org/officeDocument/2006/customXml" ds:itemID="{100F1594-3EA9-4B35-B72A-00D8B89F015B}">
   <ds:schemaRefs>
-    <ds:schemaRef ds:uri="http://schemas.microsoft.com/office/2006/metadata/properties"/>
-    <ds:schemaRef ds:uri="http://schemas.microsoft.com/office/infopath/2007/PartnerControls"/>
-    <ds:schemaRef ds:uri="http://schemas.microsoft.com/sharepoint/v3"/>
-    <ds:schemaRef ds:uri="71af3243-3dd4-4a8d-8c0d-dd76da1f02a5"/>
-    <ds:schemaRef ds:uri="230e9df3-be65-4c73-a93b-d1236ebd677e"/>
+    <ds:schemaRef ds:uri="http://schemas.microsoft.com/sharepoint/v3/contenttype/forms"/>
   </ds:schemaRefs>
 </ds:datastoreItem>
 </file>

</xml_diff>